<commit_message>
add link to code of conduct
</commit_message>
<xml_diff>
--- a/PRESENTATIONS/2024-09-tpac/2024-09-26-WoT-TPAC-Opening-McCool.pptx
+++ b/PRESENTATIONS/2024-09-tpac/2024-09-26-WoT-TPAC-Opening-McCool.pptx
@@ -131,7 +131,7 @@
 <file path=ppt/revisionInfo.xml><?xml version="1.0" encoding="utf-8"?>
 <p1510:revInfo xmlns:a="http://schemas.openxmlformats.org/drawingml/2006/main" xmlns:r="http://schemas.openxmlformats.org/officeDocument/2006/relationships" xmlns:p1510="http://schemas.microsoft.com/office/powerpoint/2015/10/main">
   <p1510:revLst>
-    <p1510:client id="{EB9BB0E3-461B-4D73-A814-E3F502ACEAA4}" v="4" dt="2024-09-25T13:51:08.062"/>
+    <p1510:client id="{EB9BB0E3-461B-4D73-A814-E3F502ACEAA4}" v="5" dt="2024-09-26T17:08:21.520"/>
   </p1510:revLst>
 </p1510:revInfo>
 </file>
@@ -141,7 +141,7 @@
   <pc:docChgLst>
     <pc:chgData name="Mccool, Michael" userId="9022b910-48f5-4b36-ad75-783e2c5f7356" providerId="ADAL" clId="{EB9BB0E3-461B-4D73-A814-E3F502ACEAA4}"/>
     <pc:docChg chg="custSel addSld delSld modSld">
-      <pc:chgData name="Mccool, Michael" userId="9022b910-48f5-4b36-ad75-783e2c5f7356" providerId="ADAL" clId="{EB9BB0E3-461B-4D73-A814-E3F502ACEAA4}" dt="2024-09-25T13:51:24.054" v="831" actId="20577"/>
+      <pc:chgData name="Mccool, Michael" userId="9022b910-48f5-4b36-ad75-783e2c5f7356" providerId="ADAL" clId="{EB9BB0E3-461B-4D73-A814-E3F502ACEAA4}" dt="2024-09-26T17:08:32.768" v="871" actId="14"/>
       <pc:docMkLst>
         <pc:docMk/>
       </pc:docMkLst>
@@ -169,7 +169,7 @@
         </pc:spChg>
       </pc:sldChg>
       <pc:sldChg chg="modSp mod">
-        <pc:chgData name="Mccool, Michael" userId="9022b910-48f5-4b36-ad75-783e2c5f7356" providerId="ADAL" clId="{EB9BB0E3-461B-4D73-A814-E3F502ACEAA4}" dt="2024-09-25T13:51:12.435" v="818" actId="15"/>
+        <pc:chgData name="Mccool, Michael" userId="9022b910-48f5-4b36-ad75-783e2c5f7356" providerId="ADAL" clId="{EB9BB0E3-461B-4D73-A814-E3F502ACEAA4}" dt="2024-09-26T17:08:32.768" v="871" actId="14"/>
         <pc:sldMkLst>
           <pc:docMk/>
           <pc:sldMk cId="2239956326" sldId="257"/>
@@ -183,7 +183,7 @@
           </ac:spMkLst>
         </pc:spChg>
         <pc:spChg chg="mod">
-          <ac:chgData name="Mccool, Michael" userId="9022b910-48f5-4b36-ad75-783e2c5f7356" providerId="ADAL" clId="{EB9BB0E3-461B-4D73-A814-E3F502ACEAA4}" dt="2024-09-25T13:51:12.435" v="818" actId="15"/>
+          <ac:chgData name="Mccool, Michael" userId="9022b910-48f5-4b36-ad75-783e2c5f7356" providerId="ADAL" clId="{EB9BB0E3-461B-4D73-A814-E3F502ACEAA4}" dt="2024-09-26T17:08:32.768" v="871" actId="14"/>
           <ac:spMkLst>
             <pc:docMk/>
             <pc:sldMk cId="2239956326" sldId="257"/>
@@ -324,7 +324,7 @@
           <a:p>
             <a:fld id="{8389B5DD-0274-BF45-B4C5-62E173E8F634}" type="datetimeFigureOut">
               <a:rPr lang="en-US" smtClean="0"/>
-              <a:t>9/25/2024</a:t>
+              <a:t>9/26/2024</a:t>
             </a:fld>
             <a:endParaRPr lang="en-US"/>
           </a:p>
@@ -940,7 +940,7 @@
           <a:p>
             <a:fld id="{2F93E591-CC8D-C74E-8EED-098A7FB5E64D}" type="datetime1">
               <a:rPr lang="en-CA" smtClean="0"/>
-              <a:t>2024-09-25</a:t>
+              <a:t>2024-09-26</a:t>
             </a:fld>
             <a:endParaRPr lang="en-US"/>
           </a:p>
@@ -1208,7 +1208,7 @@
           <a:p>
             <a:fld id="{2E1BC118-574D-594E-ABEA-A7C82666C9AB}" type="datetime1">
               <a:rPr lang="en-CA" smtClean="0"/>
-              <a:t>2024-09-25</a:t>
+              <a:t>2024-09-26</a:t>
             </a:fld>
             <a:endParaRPr lang="en-US"/>
           </a:p>
@@ -1574,7 +1574,7 @@
           <a:p>
             <a:fld id="{B929AB1E-7FD9-0A40-B7C0-508CCACB3E9A}" type="datetime1">
               <a:rPr lang="en-CA" smtClean="0"/>
-              <a:t>2024-09-25</a:t>
+              <a:t>2024-09-26</a:t>
             </a:fld>
             <a:endParaRPr lang="en-US"/>
           </a:p>
@@ -1806,7 +1806,7 @@
           <a:p>
             <a:fld id="{5AE8723F-57EA-4C47-97B9-92AFDEEF85DC}" type="datetime1">
               <a:rPr lang="en-CA" smtClean="0"/>
-              <a:t>2024-09-25</a:t>
+              <a:t>2024-09-26</a:t>
             </a:fld>
             <a:endParaRPr lang="en-US"/>
           </a:p>
@@ -2136,7 +2136,7 @@
           <a:p>
             <a:fld id="{B2B00E5D-EC04-AA49-8D52-0FCB6E08F63D}" type="datetime1">
               <a:rPr lang="en-CA" smtClean="0"/>
-              <a:t>2024-09-25</a:t>
+              <a:t>2024-09-26</a:t>
             </a:fld>
             <a:endParaRPr lang="en-US"/>
           </a:p>
@@ -2609,7 +2609,7 @@
           <a:p>
             <a:fld id="{FF90905C-10FF-8047-AA7E-6DC7E8B6AF51}" type="datetime1">
               <a:rPr lang="en-CA" smtClean="0"/>
-              <a:t>2024-09-25</a:t>
+              <a:t>2024-09-26</a:t>
             </a:fld>
             <a:endParaRPr lang="en-US"/>
           </a:p>
@@ -2815,7 +2815,7 @@
           <a:p>
             <a:fld id="{D1CE86E2-4400-D342-BEEC-F9C1ADF6F9F7}" type="datetime1">
               <a:rPr lang="en-CA" smtClean="0"/>
-              <a:t>2024-09-25</a:t>
+              <a:t>2024-09-26</a:t>
             </a:fld>
             <a:endParaRPr lang="en-US"/>
           </a:p>
@@ -2985,7 +2985,7 @@
           <a:p>
             <a:fld id="{74358A08-7221-7F45-8378-69D5559861DD}" type="datetime1">
               <a:rPr lang="en-CA" smtClean="0"/>
-              <a:t>2024-09-25</a:t>
+              <a:t>2024-09-26</a:t>
             </a:fld>
             <a:endParaRPr lang="en-US"/>
           </a:p>
@@ -3357,7 +3357,7 @@
           <a:p>
             <a:fld id="{08C20FDB-303D-8A4E-83B7-226DD88B97BD}" type="datetime1">
               <a:rPr lang="en-CA" smtClean="0"/>
-              <a:t>2024-09-25</a:t>
+              <a:t>2024-09-26</a:t>
             </a:fld>
             <a:endParaRPr lang="en-US"/>
           </a:p>
@@ -3709,7 +3709,7 @@
           <a:p>
             <a:fld id="{0A9EBA37-9D18-D34A-A88D-1B00AA06E95C}" type="datetime1">
               <a:rPr lang="en-CA" smtClean="0"/>
-              <a:t>2024-09-25</a:t>
+              <a:t>2024-09-26</a:t>
             </a:fld>
             <a:endParaRPr lang="en-US"/>
           </a:p>
@@ -4049,7 +4049,7 @@
             <a:fld id="{B73A2E78-F38A-E046-ACDB-668F070D1EF6}" type="datetime1">
               <a:rPr lang="en-CA" smtClean="0"/>
               <a:pPr/>
-              <a:t>2024-09-25</a:t>
+              <a:t>2024-09-26</a:t>
             </a:fld>
             <a:endParaRPr lang="en-US" dirty="0"/>
           </a:p>
@@ -4610,7 +4610,9 @@
         </p:nvSpPr>
         <p:spPr/>
         <p:txBody>
-          <a:bodyPr/>
+          <a:bodyPr>
+            <a:normAutofit fontScale="92500" lnSpcReduction="10000"/>
+          </a:bodyPr>
           <a:lstStyle/>
           <a:p>
             <a:r>
@@ -4624,9 +4626,12 @@
               <a:rPr lang="en-US" dirty="0">
                 <a:hlinkClick r:id="rId2"/>
               </a:rPr>
-              <a:t>https://www.w3.org/2024/09/TPAC/participation.html</a:t>
-            </a:r>
-            <a:endParaRPr lang="en-US" dirty="0"/>
+              <a:t>https://www.w3.org/policies/code-of-conduct/</a:t>
+            </a:r>
+            <a:r>
+              <a:rPr lang="en-US" dirty="0"/>
+              <a:t> </a:t>
+            </a:r>
           </a:p>
           <a:p>
             <a:pPr lvl="1"/>
@@ -4634,6 +4639,16 @@
               <a:rPr lang="en-US" dirty="0">
                 <a:hlinkClick r:id="rId3"/>
               </a:rPr>
+              <a:t>https://www.w3.org/2024/09/TPAC/participation.html</a:t>
+            </a:r>
+            <a:endParaRPr lang="en-US" dirty="0"/>
+          </a:p>
+          <a:p>
+            <a:pPr lvl="1"/>
+            <a:r>
+              <a:rPr lang="en-US" dirty="0">
+                <a:hlinkClick r:id="rId4"/>
+              </a:rPr>
               <a:t>https://www.w3.org/2024/09/TPAC/health.html</a:t>
             </a:r>
             <a:endParaRPr lang="en-US" dirty="0"/>
@@ -4651,6 +4666,18 @@
               <a:rPr lang="en-US" dirty="0"/>
               <a:t>Respect others’ choices and boundaries</a:t>
             </a:r>
+          </a:p>
+          <a:p>
+            <a:pPr lvl="1"/>
+            <a:r>
+              <a:rPr lang="en-US" dirty="0"/>
+              <a:t>Please speak slowly </a:t>
+            </a:r>
+            <a:r>
+              <a:rPr lang="en-US"/>
+              <a:t>and clearly!</a:t>
+            </a:r>
+            <a:endParaRPr lang="en-US" dirty="0"/>
           </a:p>
           <a:p>
             <a:r>
@@ -4673,7 +4700,7 @@
                 <a:latin typeface="Calibri" panose="020F0502020204030204" pitchFamily="34" charset="0"/>
                 <a:ea typeface="Times New Roman" panose="02020603050405020304" pitchFamily="18" charset="0"/>
                 <a:cs typeface="Times New Roman" panose="02020603050405020304" pitchFamily="18" charset="0"/>
-                <a:hlinkClick r:id="rId4"/>
+                <a:hlinkClick r:id="rId5"/>
               </a:rPr>
               <a:t>https://irc.w3.org/?channels=wot</a:t>
             </a:r>
@@ -4696,7 +4723,7 @@
                 <a:effectLst/>
                 <a:ea typeface="Yu Gothic" panose="020B0400000000000000" pitchFamily="34" charset="-128"/>
                 <a:cs typeface="Times New Roman" panose="02020603050405020304" pitchFamily="18" charset="0"/>
-                <a:hlinkClick r:id="rId5"/>
+                <a:hlinkClick r:id="rId6"/>
               </a:rPr>
               <a:t>https://www.w3.org/events/meetings/09603c14-86e3-4c4a-b66f-37d2df32def5/</a:t>
             </a:r>
@@ -4720,7 +4747,7 @@
             <a:pPr lvl="2"/>
             <a:r>
               <a:rPr lang="en-US" dirty="0">
-                <a:hlinkClick r:id="rId6"/>
+                <a:hlinkClick r:id="rId7"/>
               </a:rPr>
               <a:t>https://www.w3.org/WoT/IG/wiki/Wiki_for_F2F_2024_planning</a:t>
             </a:r>
@@ -4754,7 +4781,7 @@
           <a:p>
             <a:fld id="{BF92DA42-2970-1B4D-9C1F-77F249CD7467}" type="datetime1">
               <a:rPr lang="en-CA" smtClean="0"/>
-              <a:t>2024-09-25</a:t>
+              <a:t>2024-09-26</a:t>
             </a:fld>
             <a:endParaRPr lang="en-US" dirty="0"/>
           </a:p>
@@ -5573,7 +5600,7 @@
           <a:p>
             <a:fld id="{B2B00E5D-EC04-AA49-8D52-0FCB6E08F63D}" type="datetime1">
               <a:rPr lang="en-CA" smtClean="0"/>
-              <a:t>2024-09-25</a:t>
+              <a:t>2024-09-26</a:t>
             </a:fld>
             <a:endParaRPr lang="en-US"/>
           </a:p>

</xml_diff>